<commit_message>
Reorganzation of dir + docker compose for producer
</commit_message>
<xml_diff>
--- a/01_fraud_detection_2_project.pptx
+++ b/01_fraud_detection_2_project.pptx
@@ -14,7 +14,7 @@
     <p:sldId id="275" r:id="rId5"/>
     <p:sldId id="276" r:id="rId6"/>
     <p:sldId id="272" r:id="rId7"/>
-    <p:sldId id="257" r:id="rId8"/>
+    <p:sldId id="278" r:id="rId8"/>
     <p:sldId id="263" r:id="rId9"/>
   </p:sldIdLst>
   <p:sldSz cx="12192000" cy="6858000"/>
@@ -125,7 +125,7 @@
 <file path=ppt/revisionInfo.xml><?xml version="1.0" encoding="utf-8"?>
 <p1510:revInfo xmlns:a="http://schemas.openxmlformats.org/drawingml/2006/main" xmlns:r="http://schemas.openxmlformats.org/officeDocument/2006/relationships" xmlns:p1510="http://schemas.microsoft.com/office/powerpoint/2015/10/main">
   <p1510:revLst>
-    <p1510:client id="{336F8116-C764-4979-A376-3E7AF7BA8383}" v="31" dt="2024-10-31T08:14:59.249"/>
+    <p1510:client id="{336F8116-C764-4979-A376-3E7AF7BA8383}" v="32" dt="2024-10-31T08:26:12.272"/>
   </p1510:revLst>
 </p1510:revInfo>
 </file>
@@ -662,7 +662,7 @@
   <pc:docChgLst>
     <pc:chgData name="Philippe Baucour" userId="5102170ae7533958" providerId="LiveId" clId="{336F8116-C764-4979-A376-3E7AF7BA8383}"/>
     <pc:docChg chg="undo custSel addSld delSld modSld">
-      <pc:chgData name="Philippe Baucour" userId="5102170ae7533958" providerId="LiveId" clId="{336F8116-C764-4979-A376-3E7AF7BA8383}" dt="2024-10-31T08:15:31.103" v="378"/>
+      <pc:chgData name="Philippe Baucour" userId="5102170ae7533958" providerId="LiveId" clId="{336F8116-C764-4979-A376-3E7AF7BA8383}" dt="2024-10-31T08:26:19.274" v="398" actId="47"/>
       <pc:docMkLst>
         <pc:docMk/>
       </pc:docMkLst>
@@ -745,14 +745,14 @@
           </ac:picMkLst>
         </pc:picChg>
       </pc:sldChg>
-      <pc:sldChg chg="addSp modSp mod modAnim modNotesTx">
-        <pc:chgData name="Philippe Baucour" userId="5102170ae7533958" providerId="LiveId" clId="{336F8116-C764-4979-A376-3E7AF7BA8383}" dt="2024-10-31T07:57:55.088" v="167" actId="1076"/>
+      <pc:sldChg chg="addSp modSp del mod modAnim modNotesTx">
+        <pc:chgData name="Philippe Baucour" userId="5102170ae7533958" providerId="LiveId" clId="{336F8116-C764-4979-A376-3E7AF7BA8383}" dt="2024-10-31T08:26:17.477" v="397" actId="47"/>
         <pc:sldMkLst>
           <pc:docMk/>
           <pc:sldMk cId="3201622378" sldId="257"/>
         </pc:sldMkLst>
         <pc:spChg chg="mod">
-          <ac:chgData name="Philippe Baucour" userId="5102170ae7533958" providerId="LiveId" clId="{336F8116-C764-4979-A376-3E7AF7BA8383}" dt="2024-10-31T07:40:59.175" v="32" actId="6549"/>
+          <ac:chgData name="Philippe Baucour" userId="5102170ae7533958" providerId="LiveId" clId="{336F8116-C764-4979-A376-3E7AF7BA8383}" dt="2024-10-31T08:25:43.847" v="385" actId="14100"/>
           <ac:spMkLst>
             <pc:docMk/>
             <pc:sldMk cId="3201622378" sldId="257"/>
@@ -1337,6 +1337,108 @@
             <ac:inkMk id="12" creationId="{9815D4A5-A626-4301-A66D-A42474AB7AEC}"/>
           </ac:inkMkLst>
         </pc:inkChg>
+      </pc:sldChg>
+      <pc:sldChg chg="new del">
+        <pc:chgData name="Philippe Baucour" userId="5102170ae7533958" providerId="LiveId" clId="{336F8116-C764-4979-A376-3E7AF7BA8383}" dt="2024-10-31T08:26:19.274" v="398" actId="47"/>
+        <pc:sldMkLst>
+          <pc:docMk/>
+          <pc:sldMk cId="3271177466" sldId="277"/>
+        </pc:sldMkLst>
+      </pc:sldChg>
+      <pc:sldChg chg="addSp modSp new mod modAnim">
+        <pc:chgData name="Philippe Baucour" userId="5102170ae7533958" providerId="LiveId" clId="{336F8116-C764-4979-A376-3E7AF7BA8383}" dt="2024-10-31T08:26:12.272" v="396"/>
+        <pc:sldMkLst>
+          <pc:docMk/>
+          <pc:sldMk cId="1654938590" sldId="278"/>
+        </pc:sldMkLst>
+        <pc:spChg chg="mod">
+          <ac:chgData name="Philippe Baucour" userId="5102170ae7533958" providerId="LiveId" clId="{336F8116-C764-4979-A376-3E7AF7BA8383}" dt="2024-10-31T08:25:57.478" v="395" actId="20577"/>
+          <ac:spMkLst>
+            <pc:docMk/>
+            <pc:sldMk cId="1654938590" sldId="278"/>
+            <ac:spMk id="2" creationId="{60257E28-05BA-9ACE-4EF3-4D1FB62A30F6}"/>
+          </ac:spMkLst>
+        </pc:spChg>
+        <pc:spChg chg="mod">
+          <ac:chgData name="Philippe Baucour" userId="5102170ae7533958" providerId="LiveId" clId="{336F8116-C764-4979-A376-3E7AF7BA8383}" dt="2024-10-31T08:26:12.272" v="396"/>
+          <ac:spMkLst>
+            <pc:docMk/>
+            <pc:sldMk cId="1654938590" sldId="278"/>
+            <ac:spMk id="5" creationId="{A8E16F1F-20B5-EF5E-4DB3-8C4A87BABC24}"/>
+          </ac:spMkLst>
+        </pc:spChg>
+        <pc:spChg chg="mod">
+          <ac:chgData name="Philippe Baucour" userId="5102170ae7533958" providerId="LiveId" clId="{336F8116-C764-4979-A376-3E7AF7BA8383}" dt="2024-10-31T08:26:12.272" v="396"/>
+          <ac:spMkLst>
+            <pc:docMk/>
+            <pc:sldMk cId="1654938590" sldId="278"/>
+            <ac:spMk id="7" creationId="{BBF82FE4-3ABD-A08E-1E4F-412647BAA0E6}"/>
+          </ac:spMkLst>
+        </pc:spChg>
+        <pc:spChg chg="mod">
+          <ac:chgData name="Philippe Baucour" userId="5102170ae7533958" providerId="LiveId" clId="{336F8116-C764-4979-A376-3E7AF7BA8383}" dt="2024-10-31T08:26:12.272" v="396"/>
+          <ac:spMkLst>
+            <pc:docMk/>
+            <pc:sldMk cId="1654938590" sldId="278"/>
+            <ac:spMk id="8" creationId="{8AE9D43A-D4A6-8714-4A5D-ECA58526DE83}"/>
+          </ac:spMkLst>
+        </pc:spChg>
+        <pc:spChg chg="mod">
+          <ac:chgData name="Philippe Baucour" userId="5102170ae7533958" providerId="LiveId" clId="{336F8116-C764-4979-A376-3E7AF7BA8383}" dt="2024-10-31T08:26:12.272" v="396"/>
+          <ac:spMkLst>
+            <pc:docMk/>
+            <pc:sldMk cId="1654938590" sldId="278"/>
+            <ac:spMk id="9" creationId="{099B2D79-0059-37A5-88B7-AD1CB067A7C9}"/>
+          </ac:spMkLst>
+        </pc:spChg>
+        <pc:spChg chg="mod">
+          <ac:chgData name="Philippe Baucour" userId="5102170ae7533958" providerId="LiveId" clId="{336F8116-C764-4979-A376-3E7AF7BA8383}" dt="2024-10-31T08:26:12.272" v="396"/>
+          <ac:spMkLst>
+            <pc:docMk/>
+            <pc:sldMk cId="1654938590" sldId="278"/>
+            <ac:spMk id="10" creationId="{E85F8C96-6023-FF04-B3FE-D401F415DC04}"/>
+          </ac:spMkLst>
+        </pc:spChg>
+        <pc:spChg chg="mod">
+          <ac:chgData name="Philippe Baucour" userId="5102170ae7533958" providerId="LiveId" clId="{336F8116-C764-4979-A376-3E7AF7BA8383}" dt="2024-10-31T08:26:12.272" v="396"/>
+          <ac:spMkLst>
+            <pc:docMk/>
+            <pc:sldMk cId="1654938590" sldId="278"/>
+            <ac:spMk id="11" creationId="{58EACB9F-A3C6-F4F7-51A1-766C0E13D7E4}"/>
+          </ac:spMkLst>
+        </pc:spChg>
+        <pc:spChg chg="mod">
+          <ac:chgData name="Philippe Baucour" userId="5102170ae7533958" providerId="LiveId" clId="{336F8116-C764-4979-A376-3E7AF7BA8383}" dt="2024-10-31T08:26:12.272" v="396"/>
+          <ac:spMkLst>
+            <pc:docMk/>
+            <pc:sldMk cId="1654938590" sldId="278"/>
+            <ac:spMk id="12" creationId="{C79B4534-4254-E360-623D-2BAA565B66C9}"/>
+          </ac:spMkLst>
+        </pc:spChg>
+        <pc:grpChg chg="add mod">
+          <ac:chgData name="Philippe Baucour" userId="5102170ae7533958" providerId="LiveId" clId="{336F8116-C764-4979-A376-3E7AF7BA8383}" dt="2024-10-31T08:26:12.272" v="396"/>
+          <ac:grpSpMkLst>
+            <pc:docMk/>
+            <pc:sldMk cId="1654938590" sldId="278"/>
+            <ac:grpSpMk id="4" creationId="{D1B096AC-71AA-73EE-A8CB-8A4DCE69EA04}"/>
+          </ac:grpSpMkLst>
+        </pc:grpChg>
+        <pc:grpChg chg="mod">
+          <ac:chgData name="Philippe Baucour" userId="5102170ae7533958" providerId="LiveId" clId="{336F8116-C764-4979-A376-3E7AF7BA8383}" dt="2024-10-31T08:26:12.272" v="396"/>
+          <ac:grpSpMkLst>
+            <pc:docMk/>
+            <pc:sldMk cId="1654938590" sldId="278"/>
+            <ac:grpSpMk id="6" creationId="{4B2C5C5F-DB0E-D153-A57D-CA4892DB18C7}"/>
+          </ac:grpSpMkLst>
+        </pc:grpChg>
+        <pc:picChg chg="add mod">
+          <ac:chgData name="Philippe Baucour" userId="5102170ae7533958" providerId="LiveId" clId="{336F8116-C764-4979-A376-3E7AF7BA8383}" dt="2024-10-31T08:26:12.272" v="396"/>
+          <ac:picMkLst>
+            <pc:docMk/>
+            <pc:sldMk cId="1654938590" sldId="278"/>
+            <ac:picMk id="13" creationId="{928B1538-7E36-F646-9D1A-D493F92DDC93}"/>
+          </ac:picMkLst>
+        </pc:picChg>
       </pc:sldChg>
     </pc:docChg>
   </pc:docChgLst>
@@ -4911,90 +5013,6 @@
 </p:notes>
 </file>
 
-<file path=ppt/notesSlides/notesSlide4.xml><?xml version="1.0" encoding="utf-8"?>
-<p:notes xmlns:a="http://schemas.openxmlformats.org/drawingml/2006/main" xmlns:r="http://schemas.openxmlformats.org/officeDocument/2006/relationships" xmlns:p="http://schemas.openxmlformats.org/presentationml/2006/main">
-  <p:cSld>
-    <p:spTree>
-      <p:nvGrpSpPr>
-        <p:cNvPr id="1" name=""/>
-        <p:cNvGrpSpPr/>
-        <p:nvPr/>
-      </p:nvGrpSpPr>
-      <p:grpSpPr>
-        <a:xfrm>
-          <a:off x="0" y="0"/>
-          <a:ext cx="0" cy="0"/>
-          <a:chOff x="0" y="0"/>
-          <a:chExt cx="0" cy="0"/>
-        </a:xfrm>
-      </p:grpSpPr>
-      <p:sp>
-        <p:nvSpPr>
-          <p:cNvPr id="2" name="Espace réservé de l'image des diapositives 1"/>
-          <p:cNvSpPr>
-            <a:spLocks noGrp="1" noRot="1" noChangeAspect="1"/>
-          </p:cNvSpPr>
-          <p:nvPr>
-            <p:ph type="sldImg"/>
-          </p:nvPr>
-        </p:nvSpPr>
-        <p:spPr/>
-      </p:sp>
-      <p:sp>
-        <p:nvSpPr>
-          <p:cNvPr id="3" name="Espace réservé des notes 2"/>
-          <p:cNvSpPr>
-            <a:spLocks noGrp="1"/>
-          </p:cNvSpPr>
-          <p:nvPr>
-            <p:ph type="body" idx="1"/>
-          </p:nvPr>
-        </p:nvSpPr>
-        <p:spPr/>
-        <p:txBody>
-          <a:bodyPr/>
-          <a:lstStyle/>
-          <a:p>
-            <a:endParaRPr lang="fr-FR" dirty="0"/>
-          </a:p>
-        </p:txBody>
-      </p:sp>
-      <p:sp>
-        <p:nvSpPr>
-          <p:cNvPr id="4" name="Espace réservé du numéro de diapositive 3"/>
-          <p:cNvSpPr>
-            <a:spLocks noGrp="1"/>
-          </p:cNvSpPr>
-          <p:nvPr>
-            <p:ph type="sldNum" sz="quarter" idx="5"/>
-          </p:nvPr>
-        </p:nvSpPr>
-        <p:spPr/>
-        <p:txBody>
-          <a:bodyPr/>
-          <a:lstStyle/>
-          <a:p>
-            <a:fld id="{341AEC00-4977-4C47-A11B-52155DC12F54}" type="slidenum">
-              <a:rPr lang="fr-FR" smtClean="0"/>
-              <a:t>7</a:t>
-            </a:fld>
-            <a:endParaRPr lang="fr-FR"/>
-          </a:p>
-        </p:txBody>
-      </p:sp>
-    </p:spTree>
-    <p:extLst>
-      <p:ext uri="{BB962C8B-B14F-4D97-AF65-F5344CB8AC3E}">
-        <p14:creationId xmlns:p14="http://schemas.microsoft.com/office/powerpoint/2010/main" val="1381811954"/>
-      </p:ext>
-    </p:extLst>
-  </p:cSld>
-  <p:clrMapOvr>
-    <a:masterClrMapping/>
-  </p:clrMapOvr>
-</p:notes>
-</file>
-
 <file path=ppt/slideLayouts/slideLayout1.xml><?xml version="1.0" encoding="utf-8"?>
 <p:sldLayout xmlns:a="http://schemas.openxmlformats.org/drawingml/2006/main" xmlns:r="http://schemas.openxmlformats.org/officeDocument/2006/relationships" xmlns:p="http://schemas.openxmlformats.org/presentationml/2006/main" type="title" preserve="1">
   <p:cSld name="Diapositive de titre">
@@ -9133,8 +9151,8 @@
           </a:effectLst>
         </p:spPr>
       </p:pic>
-      <mc:AlternateContent xmlns:mc="http://schemas.openxmlformats.org/markup-compatibility/2006">
-        <mc:Choice xmlns:p14="http://schemas.microsoft.com/office/powerpoint/2010/main" Requires="p14">
+      <mc:AlternateContent xmlns:mc="http://schemas.openxmlformats.org/markup-compatibility/2006" xmlns:p14="http://schemas.microsoft.com/office/powerpoint/2010/main">
+        <mc:Choice Requires="p14">
           <p:contentPart p14:bwMode="auto" r:id="rId4">
             <p14:nvContentPartPr>
               <p14:cNvPr id="10" name="Encre 9">
@@ -9153,7 +9171,7 @@
             </p14:xfrm>
           </p:contentPart>
         </mc:Choice>
-        <mc:Fallback>
+        <mc:Fallback xmlns="">
           <p:pic>
             <p:nvPicPr>
               <p:cNvPr id="10" name="Encre 9">
@@ -9184,8 +9202,8 @@
           </p:pic>
         </mc:Fallback>
       </mc:AlternateContent>
-      <mc:AlternateContent xmlns:mc="http://schemas.openxmlformats.org/markup-compatibility/2006">
-        <mc:Choice xmlns:p14="http://schemas.microsoft.com/office/powerpoint/2010/main" Requires="p14">
+      <mc:AlternateContent xmlns:mc="http://schemas.openxmlformats.org/markup-compatibility/2006" xmlns:p14="http://schemas.microsoft.com/office/powerpoint/2010/main">
+        <mc:Choice Requires="p14">
           <p:contentPart p14:bwMode="auto" r:id="rId6">
             <p14:nvContentPartPr>
               <p14:cNvPr id="16" name="Encre 15">
@@ -9204,7 +9222,7 @@
             </p14:xfrm>
           </p:contentPart>
         </mc:Choice>
-        <mc:Fallback>
+        <mc:Fallback xmlns="">
           <p:pic>
             <p:nvPicPr>
               <p:cNvPr id="16" name="Encre 15">
@@ -9235,8 +9253,8 @@
           </p:pic>
         </mc:Fallback>
       </mc:AlternateContent>
-      <mc:AlternateContent xmlns:mc="http://schemas.openxmlformats.org/markup-compatibility/2006">
-        <mc:Choice xmlns:p14="http://schemas.microsoft.com/office/powerpoint/2010/main" Requires="p14">
+      <mc:AlternateContent xmlns:mc="http://schemas.openxmlformats.org/markup-compatibility/2006" xmlns:p14="http://schemas.microsoft.com/office/powerpoint/2010/main">
+        <mc:Choice Requires="p14">
           <p:contentPart p14:bwMode="auto" r:id="rId8">
             <p14:nvContentPartPr>
               <p14:cNvPr id="17" name="Encre 16">
@@ -9255,7 +9273,7 @@
             </p14:xfrm>
           </p:contentPart>
         </mc:Choice>
-        <mc:Fallback>
+        <mc:Fallback xmlns="">
           <p:pic>
             <p:nvPicPr>
               <p:cNvPr id="17" name="Encre 16">
@@ -9286,8 +9304,8 @@
           </p:pic>
         </mc:Fallback>
       </mc:AlternateContent>
-      <mc:AlternateContent xmlns:mc="http://schemas.openxmlformats.org/markup-compatibility/2006">
-        <mc:Choice xmlns:p14="http://schemas.microsoft.com/office/powerpoint/2010/main" Requires="p14">
+      <mc:AlternateContent xmlns:mc="http://schemas.openxmlformats.org/markup-compatibility/2006" xmlns:p14="http://schemas.microsoft.com/office/powerpoint/2010/main">
+        <mc:Choice Requires="p14">
           <p:contentPart p14:bwMode="auto" r:id="rId10">
             <p14:nvContentPartPr>
               <p14:cNvPr id="18" name="Encre 17">
@@ -9306,7 +9324,7 @@
             </p14:xfrm>
           </p:contentPart>
         </mc:Choice>
-        <mc:Fallback>
+        <mc:Fallback xmlns="">
           <p:pic>
             <p:nvPicPr>
               <p:cNvPr id="18" name="Encre 17">
@@ -9337,8 +9355,8 @@
           </p:pic>
         </mc:Fallback>
       </mc:AlternateContent>
-      <mc:AlternateContent xmlns:mc="http://schemas.openxmlformats.org/markup-compatibility/2006">
-        <mc:Choice xmlns:p14="http://schemas.microsoft.com/office/powerpoint/2010/main" Requires="p14">
+      <mc:AlternateContent xmlns:mc="http://schemas.openxmlformats.org/markup-compatibility/2006" xmlns:p14="http://schemas.microsoft.com/office/powerpoint/2010/main">
+        <mc:Choice Requires="p14">
           <p:contentPart p14:bwMode="auto" r:id="rId12">
             <p14:nvContentPartPr>
               <p14:cNvPr id="19" name="Encre 18">
@@ -9357,7 +9375,7 @@
             </p14:xfrm>
           </p:contentPart>
         </mc:Choice>
-        <mc:Fallback>
+        <mc:Fallback xmlns="">
           <p:pic>
             <p:nvPicPr>
               <p:cNvPr id="19" name="Encre 18">
@@ -9388,8 +9406,8 @@
           </p:pic>
         </mc:Fallback>
       </mc:AlternateContent>
-      <mc:AlternateContent xmlns:mc="http://schemas.openxmlformats.org/markup-compatibility/2006">
-        <mc:Choice xmlns:p14="http://schemas.microsoft.com/office/powerpoint/2010/main" Requires="p14">
+      <mc:AlternateContent xmlns:mc="http://schemas.openxmlformats.org/markup-compatibility/2006" xmlns:p14="http://schemas.microsoft.com/office/powerpoint/2010/main">
+        <mc:Choice Requires="p14">
           <p:contentPart p14:bwMode="auto" r:id="rId14">
             <p14:nvContentPartPr>
               <p14:cNvPr id="20" name="Encre 19">
@@ -9408,7 +9426,7 @@
             </p14:xfrm>
           </p:contentPart>
         </mc:Choice>
-        <mc:Fallback>
+        <mc:Fallback xmlns="">
           <p:pic>
             <p:nvPicPr>
               <p:cNvPr id="20" name="Encre 19">
@@ -9439,8 +9457,8 @@
           </p:pic>
         </mc:Fallback>
       </mc:AlternateContent>
-      <mc:AlternateContent xmlns:mc="http://schemas.openxmlformats.org/markup-compatibility/2006">
-        <mc:Choice xmlns:p14="http://schemas.microsoft.com/office/powerpoint/2010/main" Requires="p14">
+      <mc:AlternateContent xmlns:mc="http://schemas.openxmlformats.org/markup-compatibility/2006" xmlns:p14="http://schemas.microsoft.com/office/powerpoint/2010/main">
+        <mc:Choice Requires="p14">
           <p:contentPart p14:bwMode="auto" r:id="rId16">
             <p14:nvContentPartPr>
               <p14:cNvPr id="21" name="Encre 20">
@@ -9459,7 +9477,7 @@
             </p14:xfrm>
           </p:contentPart>
         </mc:Choice>
-        <mc:Fallback>
+        <mc:Fallback xmlns="">
           <p:pic>
             <p:nvPicPr>
               <p:cNvPr id="21" name="Encre 20">
@@ -9490,8 +9508,8 @@
           </p:pic>
         </mc:Fallback>
       </mc:AlternateContent>
-      <mc:AlternateContent xmlns:mc="http://schemas.openxmlformats.org/markup-compatibility/2006">
-        <mc:Choice xmlns:p14="http://schemas.microsoft.com/office/powerpoint/2010/main" Requires="p14">
+      <mc:AlternateContent xmlns:mc="http://schemas.openxmlformats.org/markup-compatibility/2006" xmlns:p14="http://schemas.microsoft.com/office/powerpoint/2010/main">
+        <mc:Choice Requires="p14">
           <p:contentPart p14:bwMode="auto" r:id="rId18">
             <p14:nvContentPartPr>
               <p14:cNvPr id="22" name="Encre 21">
@@ -9510,7 +9528,7 @@
             </p14:xfrm>
           </p:contentPart>
         </mc:Choice>
-        <mc:Fallback>
+        <mc:Fallback xmlns="">
           <p:pic>
             <p:nvPicPr>
               <p:cNvPr id="22" name="Encre 21">
@@ -9541,8 +9559,8 @@
           </p:pic>
         </mc:Fallback>
       </mc:AlternateContent>
-      <mc:AlternateContent xmlns:mc="http://schemas.openxmlformats.org/markup-compatibility/2006">
-        <mc:Choice xmlns:p14="http://schemas.microsoft.com/office/powerpoint/2010/main" Requires="p14">
+      <mc:AlternateContent xmlns:mc="http://schemas.openxmlformats.org/markup-compatibility/2006" xmlns:p14="http://schemas.microsoft.com/office/powerpoint/2010/main">
+        <mc:Choice Requires="p14">
           <p:contentPart p14:bwMode="auto" r:id="rId20">
             <p14:nvContentPartPr>
               <p14:cNvPr id="23" name="Encre 22">
@@ -9561,7 +9579,7 @@
             </p14:xfrm>
           </p:contentPart>
         </mc:Choice>
-        <mc:Fallback>
+        <mc:Fallback xmlns="">
           <p:pic>
             <p:nvPicPr>
               <p:cNvPr id="23" name="Encre 22">
@@ -9592,8 +9610,8 @@
           </p:pic>
         </mc:Fallback>
       </mc:AlternateContent>
-      <mc:AlternateContent xmlns:mc="http://schemas.openxmlformats.org/markup-compatibility/2006">
-        <mc:Choice xmlns:p14="http://schemas.microsoft.com/office/powerpoint/2010/main" Requires="p14">
+      <mc:AlternateContent xmlns:mc="http://schemas.openxmlformats.org/markup-compatibility/2006" xmlns:p14="http://schemas.microsoft.com/office/powerpoint/2010/main">
+        <mc:Choice Requires="p14">
           <p:contentPart p14:bwMode="auto" r:id="rId22">
             <p14:nvContentPartPr>
               <p14:cNvPr id="25" name="Encre 24">
@@ -9612,7 +9630,7 @@
             </p14:xfrm>
           </p:contentPart>
         </mc:Choice>
-        <mc:Fallback>
+        <mc:Fallback xmlns="">
           <p:pic>
             <p:nvPicPr>
               <p:cNvPr id="25" name="Encre 24">
@@ -9643,8 +9661,8 @@
           </p:pic>
         </mc:Fallback>
       </mc:AlternateContent>
-      <mc:AlternateContent xmlns:mc="http://schemas.openxmlformats.org/markup-compatibility/2006">
-        <mc:Choice xmlns:p14="http://schemas.microsoft.com/office/powerpoint/2010/main" Requires="p14">
+      <mc:AlternateContent xmlns:mc="http://schemas.openxmlformats.org/markup-compatibility/2006" xmlns:p14="http://schemas.microsoft.com/office/powerpoint/2010/main">
+        <mc:Choice Requires="p14">
           <p:contentPart p14:bwMode="auto" r:id="rId24">
             <p14:nvContentPartPr>
               <p14:cNvPr id="26" name="Encre 25">
@@ -9663,7 +9681,7 @@
             </p14:xfrm>
           </p:contentPart>
         </mc:Choice>
-        <mc:Fallback>
+        <mc:Fallback xmlns="">
           <p:pic>
             <p:nvPicPr>
               <p:cNvPr id="26" name="Encre 25">
@@ -9694,8 +9712,8 @@
           </p:pic>
         </mc:Fallback>
       </mc:AlternateContent>
-      <mc:AlternateContent xmlns:mc="http://schemas.openxmlformats.org/markup-compatibility/2006">
-        <mc:Choice xmlns:p14="http://schemas.microsoft.com/office/powerpoint/2010/main" Requires="p14">
+      <mc:AlternateContent xmlns:mc="http://schemas.openxmlformats.org/markup-compatibility/2006" xmlns:p14="http://schemas.microsoft.com/office/powerpoint/2010/main">
+        <mc:Choice Requires="p14">
           <p:contentPart p14:bwMode="auto" r:id="rId26">
             <p14:nvContentPartPr>
               <p14:cNvPr id="27" name="Encre 26">
@@ -9714,7 +9732,7 @@
             </p14:xfrm>
           </p:contentPart>
         </mc:Choice>
-        <mc:Fallback>
+        <mc:Fallback xmlns="">
           <p:pic>
             <p:nvPicPr>
               <p:cNvPr id="27" name="Encre 26">
@@ -9745,8 +9763,8 @@
           </p:pic>
         </mc:Fallback>
       </mc:AlternateContent>
-      <mc:AlternateContent xmlns:mc="http://schemas.openxmlformats.org/markup-compatibility/2006">
-        <mc:Choice xmlns:p14="http://schemas.microsoft.com/office/powerpoint/2010/main" Requires="p14">
+      <mc:AlternateContent xmlns:mc="http://schemas.openxmlformats.org/markup-compatibility/2006" xmlns:p14="http://schemas.microsoft.com/office/powerpoint/2010/main">
+        <mc:Choice Requires="p14">
           <p:contentPart p14:bwMode="auto" r:id="rId28">
             <p14:nvContentPartPr>
               <p14:cNvPr id="28" name="Encre 27">
@@ -9765,7 +9783,7 @@
             </p14:xfrm>
           </p:contentPart>
         </mc:Choice>
-        <mc:Fallback>
+        <mc:Fallback xmlns="">
           <p:pic>
             <p:nvPicPr>
               <p:cNvPr id="28" name="Encre 27">
@@ -9796,8 +9814,8 @@
           </p:pic>
         </mc:Fallback>
       </mc:AlternateContent>
-      <mc:AlternateContent xmlns:mc="http://schemas.openxmlformats.org/markup-compatibility/2006">
-        <mc:Choice xmlns:p14="http://schemas.microsoft.com/office/powerpoint/2010/main" Requires="p14">
+      <mc:AlternateContent xmlns:mc="http://schemas.openxmlformats.org/markup-compatibility/2006" xmlns:p14="http://schemas.microsoft.com/office/powerpoint/2010/main">
+        <mc:Choice Requires="p14">
           <p:contentPart p14:bwMode="auto" r:id="rId30">
             <p14:nvContentPartPr>
               <p14:cNvPr id="29" name="Encre 28">
@@ -9816,7 +9834,7 @@
             </p14:xfrm>
           </p:contentPart>
         </mc:Choice>
-        <mc:Fallback>
+        <mc:Fallback xmlns="">
           <p:pic>
             <p:nvPicPr>
               <p:cNvPr id="29" name="Encre 28">
@@ -9847,8 +9865,8 @@
           </p:pic>
         </mc:Fallback>
       </mc:AlternateContent>
-      <mc:AlternateContent xmlns:mc="http://schemas.openxmlformats.org/markup-compatibility/2006">
-        <mc:Choice xmlns:p14="http://schemas.microsoft.com/office/powerpoint/2010/main" Requires="p14">
+      <mc:AlternateContent xmlns:mc="http://schemas.openxmlformats.org/markup-compatibility/2006" xmlns:p14="http://schemas.microsoft.com/office/powerpoint/2010/main">
+        <mc:Choice Requires="p14">
           <p:contentPart p14:bwMode="auto" r:id="rId32">
             <p14:nvContentPartPr>
               <p14:cNvPr id="30" name="Encre 29">
@@ -9867,7 +9885,7 @@
             </p14:xfrm>
           </p:contentPart>
         </mc:Choice>
-        <mc:Fallback>
+        <mc:Fallback xmlns="">
           <p:pic>
             <p:nvPicPr>
               <p:cNvPr id="30" name="Encre 29">
@@ -10076,8 +10094,8 @@
           </a:prstGeom>
         </p:spPr>
       </p:pic>
-      <mc:AlternateContent xmlns:mc="http://schemas.openxmlformats.org/markup-compatibility/2006">
-        <mc:Choice xmlns:p14="http://schemas.microsoft.com/office/powerpoint/2010/main" Requires="p14">
+      <mc:AlternateContent xmlns:mc="http://schemas.openxmlformats.org/markup-compatibility/2006" xmlns:p14="http://schemas.microsoft.com/office/powerpoint/2010/main">
+        <mc:Choice Requires="p14">
           <p:contentPart p14:bwMode="auto" r:id="rId9">
             <p14:nvContentPartPr>
               <p14:cNvPr id="12" name="Encre 11">
@@ -10096,7 +10114,7 @@
             </p14:xfrm>
           </p:contentPart>
         </mc:Choice>
-        <mc:Fallback>
+        <mc:Fallback xmlns="">
           <p:pic>
             <p:nvPicPr>
               <p:cNvPr id="12" name="Encre 11">
@@ -10454,7 +10472,7 @@
           <p:cNvPr id="2" name="Titre 1">
             <a:extLst>
               <a:ext uri="{FF2B5EF4-FFF2-40B4-BE49-F238E27FC236}">
-                <a16:creationId xmlns:a16="http://schemas.microsoft.com/office/drawing/2014/main" id="{F13D07B4-C7D9-46E1-38A0-A6EEF16B48EB}"/>
+                <a16:creationId xmlns:a16="http://schemas.microsoft.com/office/drawing/2014/main" id="{60257E28-05BA-9ACE-4EF3-4D1FB62A30F6}"/>
               </a:ext>
             </a:extLst>
           </p:cNvPr>
@@ -10491,7 +10509,7 @@
           <p:cNvPr id="3" name="Espace réservé du contenu 2">
             <a:extLst>
               <a:ext uri="{FF2B5EF4-FFF2-40B4-BE49-F238E27FC236}">
-                <a16:creationId xmlns:a16="http://schemas.microsoft.com/office/drawing/2014/main" id="{1A803C62-BD0B-D0AC-2B41-C4F420891B06}"/>
+                <a16:creationId xmlns:a16="http://schemas.microsoft.com/office/drawing/2014/main" id="{2B72B868-3A60-FEDF-3E4A-861340D9622C}"/>
               </a:ext>
             </a:extLst>
           </p:cNvPr>
@@ -10502,28 +10520,21 @@
             <p:ph idx="1"/>
           </p:nvPr>
         </p:nvSpPr>
-        <p:spPr>
-          <a:xfrm>
-            <a:off x="213360" y="1249680"/>
-            <a:ext cx="11765280" cy="5608320"/>
-          </a:xfrm>
-        </p:spPr>
+        <p:spPr/>
         <p:txBody>
-          <a:bodyPr>
-            <a:noAutofit/>
-          </a:bodyPr>
+          <a:bodyPr/>
           <a:lstStyle/>
           <a:p>
-            <a:endParaRPr lang="en-US" sz="4800" dirty="0"/>
+            <a:endParaRPr lang="fr-FR"/>
           </a:p>
         </p:txBody>
       </p:sp>
       <p:grpSp>
         <p:nvGrpSpPr>
-          <p:cNvPr id="11" name="Groupe 10">
+          <p:cNvPr id="4" name="Groupe 3">
             <a:extLst>
               <a:ext uri="{FF2B5EF4-FFF2-40B4-BE49-F238E27FC236}">
-                <a16:creationId xmlns:a16="http://schemas.microsoft.com/office/drawing/2014/main" id="{FDD87361-FF3A-98B5-71A3-588DFE266BAE}"/>
+                <a16:creationId xmlns:a16="http://schemas.microsoft.com/office/drawing/2014/main" id="{D1B096AC-71AA-73EE-A8CB-8A4DCE69EA04}"/>
               </a:ext>
             </a:extLst>
           </p:cNvPr>
@@ -10540,10 +10551,10 @@
         </p:grpSpPr>
         <p:sp>
           <p:nvSpPr>
-            <p:cNvPr id="12" name="ZoneTexte 11">
+            <p:cNvPr id="5" name="ZoneTexte 4">
               <a:extLst>
                 <a:ext uri="{FF2B5EF4-FFF2-40B4-BE49-F238E27FC236}">
-                  <a16:creationId xmlns:a16="http://schemas.microsoft.com/office/drawing/2014/main" id="{783A41CB-1C8C-0072-318C-9ACDD2D31FCD}"/>
+                  <a16:creationId xmlns:a16="http://schemas.microsoft.com/office/drawing/2014/main" id="{A8E16F1F-20B5-EF5E-4DB3-8C4A87BABC24}"/>
                 </a:ext>
               </a:extLst>
             </p:cNvPr>
@@ -10665,10 +10676,10 @@
         </p:sp>
         <p:grpSp>
           <p:nvGrpSpPr>
-            <p:cNvPr id="13" name="Groupe 12">
+            <p:cNvPr id="6" name="Groupe 5">
               <a:extLst>
                 <a:ext uri="{FF2B5EF4-FFF2-40B4-BE49-F238E27FC236}">
-                  <a16:creationId xmlns:a16="http://schemas.microsoft.com/office/drawing/2014/main" id="{A6FD6413-8259-0B90-009F-CE600DD61D3E}"/>
+                  <a16:creationId xmlns:a16="http://schemas.microsoft.com/office/drawing/2014/main" id="{4B2C5C5F-DB0E-D153-A57D-CA4892DB18C7}"/>
                 </a:ext>
               </a:extLst>
             </p:cNvPr>
@@ -10685,10 +10696,10 @@
           </p:grpSpPr>
           <p:sp>
             <p:nvSpPr>
-              <p:cNvPr id="14" name="Ellipse 13">
+              <p:cNvPr id="7" name="Ellipse 6">
                 <a:extLst>
                   <a:ext uri="{FF2B5EF4-FFF2-40B4-BE49-F238E27FC236}">
-                    <a16:creationId xmlns:a16="http://schemas.microsoft.com/office/drawing/2014/main" id="{56069F0B-CBA9-A19C-CFBF-DF4C6C6CC5E6}"/>
+                    <a16:creationId xmlns:a16="http://schemas.microsoft.com/office/drawing/2014/main" id="{BBF82FE4-3ABD-A08E-1E4F-412647BAA0E6}"/>
                   </a:ext>
                 </a:extLst>
               </p:cNvPr>
@@ -10737,10 +10748,10 @@
           </p:sp>
           <p:sp>
             <p:nvSpPr>
-              <p:cNvPr id="15" name="Ellipse 14">
+              <p:cNvPr id="8" name="Ellipse 7">
                 <a:extLst>
                   <a:ext uri="{FF2B5EF4-FFF2-40B4-BE49-F238E27FC236}">
-                    <a16:creationId xmlns:a16="http://schemas.microsoft.com/office/drawing/2014/main" id="{29C584C1-0821-363D-4E1D-7B8DBC7DE6D6}"/>
+                    <a16:creationId xmlns:a16="http://schemas.microsoft.com/office/drawing/2014/main" id="{8AE9D43A-D4A6-8714-4A5D-ECA58526DE83}"/>
                   </a:ext>
                 </a:extLst>
               </p:cNvPr>
@@ -10789,10 +10800,10 @@
           </p:sp>
           <p:sp>
             <p:nvSpPr>
-              <p:cNvPr id="16" name="Ellipse 15">
+              <p:cNvPr id="9" name="Ellipse 8">
                 <a:extLst>
                   <a:ext uri="{FF2B5EF4-FFF2-40B4-BE49-F238E27FC236}">
-                    <a16:creationId xmlns:a16="http://schemas.microsoft.com/office/drawing/2014/main" id="{79432F0D-D8C5-55B4-D5E3-2B9F312D5960}"/>
+                    <a16:creationId xmlns:a16="http://schemas.microsoft.com/office/drawing/2014/main" id="{099B2D79-0059-37A5-88B7-AD1CB067A7C9}"/>
                   </a:ext>
                 </a:extLst>
               </p:cNvPr>
@@ -10841,10 +10852,10 @@
           </p:sp>
           <p:sp>
             <p:nvSpPr>
-              <p:cNvPr id="17" name="Ellipse 16">
+              <p:cNvPr id="10" name="Ellipse 9">
                 <a:extLst>
                   <a:ext uri="{FF2B5EF4-FFF2-40B4-BE49-F238E27FC236}">
-                    <a16:creationId xmlns:a16="http://schemas.microsoft.com/office/drawing/2014/main" id="{8C887205-8EF4-1FD6-7FFA-6F3DCAD293D4}"/>
+                    <a16:creationId xmlns:a16="http://schemas.microsoft.com/office/drawing/2014/main" id="{E85F8C96-6023-FF04-B3FE-D401F415DC04}"/>
                   </a:ext>
                 </a:extLst>
               </p:cNvPr>
@@ -10893,10 +10904,10 @@
           </p:sp>
           <p:sp>
             <p:nvSpPr>
-              <p:cNvPr id="18" name="Ellipse 17">
+              <p:cNvPr id="11" name="Ellipse 10">
                 <a:extLst>
                   <a:ext uri="{FF2B5EF4-FFF2-40B4-BE49-F238E27FC236}">
-                    <a16:creationId xmlns:a16="http://schemas.microsoft.com/office/drawing/2014/main" id="{0D8E3574-8587-AE31-48BA-BD970A0112E0}"/>
+                    <a16:creationId xmlns:a16="http://schemas.microsoft.com/office/drawing/2014/main" id="{58EACB9F-A3C6-F4F7-51A1-766C0E13D7E4}"/>
                   </a:ext>
                 </a:extLst>
               </p:cNvPr>
@@ -10945,10 +10956,10 @@
           </p:sp>
           <p:sp>
             <p:nvSpPr>
-              <p:cNvPr id="19" name="Ellipse 18">
+              <p:cNvPr id="12" name="Ellipse 11">
                 <a:extLst>
                   <a:ext uri="{FF2B5EF4-FFF2-40B4-BE49-F238E27FC236}">
-                    <a16:creationId xmlns:a16="http://schemas.microsoft.com/office/drawing/2014/main" id="{AACFFDEB-A1B6-4C1E-9C27-6BB97DFD4CF9}"/>
+                    <a16:creationId xmlns:a16="http://schemas.microsoft.com/office/drawing/2014/main" id="{C79B4534-4254-E360-623D-2BAA565B66C9}"/>
                   </a:ext>
                 </a:extLst>
               </p:cNvPr>
@@ -10999,10 +11010,10 @@
       </p:grpSp>
       <p:pic>
         <p:nvPicPr>
-          <p:cNvPr id="4" name="Image 3">
+          <p:cNvPr id="13" name="Image 12">
             <a:extLst>
               <a:ext uri="{FF2B5EF4-FFF2-40B4-BE49-F238E27FC236}">
-                <a16:creationId xmlns:a16="http://schemas.microsoft.com/office/drawing/2014/main" id="{3CED2230-0550-C74D-27AF-7F25427C7A3A}"/>
+                <a16:creationId xmlns:a16="http://schemas.microsoft.com/office/drawing/2014/main" id="{928B1538-7E36-F646-9D1A-D493F92DDC93}"/>
               </a:ext>
             </a:extLst>
           </p:cNvPr>
@@ -11012,7 +11023,7 @@
           <p:nvPr/>
         </p:nvPicPr>
         <p:blipFill>
-          <a:blip r:embed="rId3"/>
+          <a:blip r:embed="rId2"/>
           <a:srcRect l="25506" t="5814" r="18520"/>
           <a:stretch/>
         </p:blipFill>
@@ -11036,7 +11047,7 @@
     </p:spTree>
     <p:extLst>
       <p:ext uri="{BB962C8B-B14F-4D97-AF65-F5344CB8AC3E}">
-        <p14:creationId xmlns:p14="http://schemas.microsoft.com/office/powerpoint/2010/main" val="3201622378"/>
+        <p14:creationId xmlns:p14="http://schemas.microsoft.com/office/powerpoint/2010/main" val="1654938590"/>
       </p:ext>
     </p:extLst>
   </p:cSld>
@@ -11080,7 +11091,7 @@
                                           </p:stCondLst>
                                         </p:cTn>
                                         <p:tgtEl>
-                                          <p:spTgt spid="4"/>
+                                          <p:spTgt spid="13"/>
                                         </p:tgtEl>
                                         <p:attrNameLst>
                                           <p:attrName>style.visibility</p:attrName>
@@ -11094,7 +11105,7 @@
                                       <p:cBhvr>
                                         <p:cTn id="7" dur="500"/>
                                         <p:tgtEl>
-                                          <p:spTgt spid="4"/>
+                                          <p:spTgt spid="13"/>
                                         </p:tgtEl>
                                       </p:cBhvr>
                                     </p:animEffect>

</xml_diff>